<commit_message>
presentation and Grained lock clean
</commit_message>
<xml_diff>
--- a/Leaplist.pptx
+++ b/Leaplist.pptx
@@ -5,7 +5,7 @@
     <p:sldMasterId id="2147483648" r:id="rId1"/>
   </p:sldMasterIdLst>
   <p:notesMasterIdLst>
-    <p:notesMasterId r:id="rId13"/>
+    <p:notesMasterId r:id="rId16"/>
   </p:notesMasterIdLst>
   <p:sldIdLst>
     <p:sldId id="256" r:id="rId2"/>
@@ -18,7 +18,10 @@
     <p:sldId id="263" r:id="rId9"/>
     <p:sldId id="264" r:id="rId10"/>
     <p:sldId id="266" r:id="rId11"/>
-    <p:sldId id="265" r:id="rId12"/>
+    <p:sldId id="270" r:id="rId12"/>
+    <p:sldId id="271" r:id="rId13"/>
+    <p:sldId id="272" r:id="rId14"/>
+    <p:sldId id="265" r:id="rId15"/>
   </p:sldIdLst>
   <p:sldSz cx="9144000" cy="6858000" type="screen4x3"/>
   <p:notesSz cx="6858000" cy="9144000"/>
@@ -119,7 +122,7 @@
   </p:defaultTextStyle>
   <p:extLst>
     <p:ext uri="{EFAFB233-063F-42B5-8137-9DF3F51BA10A}">
-      <p15:sldGuideLst xmlns:p15="http://schemas.microsoft.com/office/powerpoint/2012/main">
+      <p15:sldGuideLst xmlns:p15="http://schemas.microsoft.com/office/powerpoint/2012/main" xmlns="">
         <p15:guide id="1" orient="horz" pos="2160">
           <p15:clr>
             <a:srgbClr val="A4A3A4"/>
@@ -3886,24 +3889,26 @@
         </p:nvSpPr>
         <p:spPr/>
         <p:txBody>
-          <a:bodyPr/>
+          <a:bodyPr>
+            <a:normAutofit fontScale="90000"/>
+          </a:bodyPr>
           <a:lstStyle/>
           <a:p>
-            <a:r>
-              <a:rPr lang="en-US" dirty="0" err="1" smtClean="0">
-                <a:solidFill>
-                  <a:srgbClr val="C00000"/>
-                </a:solidFill>
-              </a:rPr>
-              <a:t>Diffrences</a:t>
-            </a:r>
             <a:r>
               <a:rPr lang="en-US" dirty="0" smtClean="0">
                 <a:solidFill>
                   <a:srgbClr val="C00000"/>
                 </a:solidFill>
               </a:rPr>
-              <a:t> between “C” and “Java”</a:t>
+              <a:t>Differences </a:t>
+            </a:r>
+            <a:r>
+              <a:rPr lang="en-US" dirty="0" smtClean="0">
+                <a:solidFill>
+                  <a:srgbClr val="C00000"/>
+                </a:solidFill>
+              </a:rPr>
+              <a:t>between “C” and “Java”</a:t>
             </a:r>
             <a:endParaRPr lang="en-US" dirty="0">
               <a:solidFill>
@@ -3928,7 +3933,37 @@
           <a:bodyPr/>
           <a:lstStyle/>
           <a:p>
-            <a:endParaRPr lang="en-US"/>
+            <a:r>
+              <a:rPr lang="en-US" dirty="0" smtClean="0"/>
+              <a:t>Memory handling.</a:t>
+            </a:r>
+          </a:p>
+          <a:p>
+            <a:r>
+              <a:rPr lang="en-US" dirty="0" smtClean="0"/>
+              <a:t>No </a:t>
+            </a:r>
+            <a:r>
+              <a:rPr lang="en-US" dirty="0" err="1" smtClean="0"/>
+              <a:t>try,catch</a:t>
+            </a:r>
+            <a:r>
+              <a:rPr lang="en-US" dirty="0" smtClean="0"/>
+              <a:t> &amp; finally in C.</a:t>
+            </a:r>
+          </a:p>
+          <a:p>
+            <a:r>
+              <a:rPr lang="en-US" dirty="0" smtClean="0"/>
+              <a:t>STM vs HTM. STM is more robust and flexible to big transactions. HTM is much more efficient.</a:t>
+            </a:r>
+          </a:p>
+          <a:p>
+            <a:r>
+              <a:rPr lang="en-US" dirty="0" smtClean="0"/>
+              <a:t>Thread debugging. </a:t>
+            </a:r>
+            <a:endParaRPr lang="en-US" dirty="0"/>
           </a:p>
         </p:txBody>
       </p:sp>
@@ -3945,14 +3980,1464 @@
   <p:timing>
     <p:tnLst>
       <p:par>
-        <p:cTn id="1" dur="indefinite" restart="never" nodeType="tmRoot"/>
+        <p:cTn id="1" dur="indefinite" restart="never" nodeType="tmRoot">
+          <p:childTnLst>
+            <p:seq concurrent="1" nextAc="seek">
+              <p:cTn id="2" dur="indefinite" nodeType="mainSeq">
+                <p:childTnLst>
+                  <p:par>
+                    <p:cTn id="3" fill="hold">
+                      <p:stCondLst>
+                        <p:cond delay="indefinite"/>
+                      </p:stCondLst>
+                      <p:childTnLst>
+                        <p:par>
+                          <p:cTn id="4" fill="hold">
+                            <p:stCondLst>
+                              <p:cond delay="0"/>
+                            </p:stCondLst>
+                            <p:childTnLst>
+                              <p:par>
+                                <p:cTn id="5" presetID="10" presetClass="entr" presetSubtype="0" fill="hold" grpId="0" nodeType="clickEffect">
+                                  <p:stCondLst>
+                                    <p:cond delay="0"/>
+                                  </p:stCondLst>
+                                  <p:childTnLst>
+                                    <p:set>
+                                      <p:cBhvr>
+                                        <p:cTn id="6" dur="1" fill="hold">
+                                          <p:stCondLst>
+                                            <p:cond delay="0"/>
+                                          </p:stCondLst>
+                                        </p:cTn>
+                                        <p:tgtEl>
+                                          <p:spTgt spid="3">
+                                            <p:txEl>
+                                              <p:pRg st="0" end="0"/>
+                                            </p:txEl>
+                                          </p:spTgt>
+                                        </p:tgtEl>
+                                        <p:attrNameLst>
+                                          <p:attrName>style.visibility</p:attrName>
+                                        </p:attrNameLst>
+                                      </p:cBhvr>
+                                      <p:to>
+                                        <p:strVal val="visible"/>
+                                      </p:to>
+                                    </p:set>
+                                    <p:animEffect transition="in" filter="fade">
+                                      <p:cBhvr>
+                                        <p:cTn id="7" dur="500"/>
+                                        <p:tgtEl>
+                                          <p:spTgt spid="3">
+                                            <p:txEl>
+                                              <p:pRg st="0" end="0"/>
+                                            </p:txEl>
+                                          </p:spTgt>
+                                        </p:tgtEl>
+                                      </p:cBhvr>
+                                    </p:animEffect>
+                                  </p:childTnLst>
+                                </p:cTn>
+                              </p:par>
+                            </p:childTnLst>
+                          </p:cTn>
+                        </p:par>
+                      </p:childTnLst>
+                    </p:cTn>
+                  </p:par>
+                  <p:par>
+                    <p:cTn id="8" fill="hold">
+                      <p:stCondLst>
+                        <p:cond delay="indefinite"/>
+                      </p:stCondLst>
+                      <p:childTnLst>
+                        <p:par>
+                          <p:cTn id="9" fill="hold">
+                            <p:stCondLst>
+                              <p:cond delay="0"/>
+                            </p:stCondLst>
+                            <p:childTnLst>
+                              <p:par>
+                                <p:cTn id="10" presetID="10" presetClass="entr" presetSubtype="0" fill="hold" grpId="0" nodeType="clickEffect">
+                                  <p:stCondLst>
+                                    <p:cond delay="0"/>
+                                  </p:stCondLst>
+                                  <p:childTnLst>
+                                    <p:set>
+                                      <p:cBhvr>
+                                        <p:cTn id="11" dur="1" fill="hold">
+                                          <p:stCondLst>
+                                            <p:cond delay="0"/>
+                                          </p:stCondLst>
+                                        </p:cTn>
+                                        <p:tgtEl>
+                                          <p:spTgt spid="3">
+                                            <p:txEl>
+                                              <p:pRg st="1" end="1"/>
+                                            </p:txEl>
+                                          </p:spTgt>
+                                        </p:tgtEl>
+                                        <p:attrNameLst>
+                                          <p:attrName>style.visibility</p:attrName>
+                                        </p:attrNameLst>
+                                      </p:cBhvr>
+                                      <p:to>
+                                        <p:strVal val="visible"/>
+                                      </p:to>
+                                    </p:set>
+                                    <p:animEffect transition="in" filter="fade">
+                                      <p:cBhvr>
+                                        <p:cTn id="12" dur="500"/>
+                                        <p:tgtEl>
+                                          <p:spTgt spid="3">
+                                            <p:txEl>
+                                              <p:pRg st="1" end="1"/>
+                                            </p:txEl>
+                                          </p:spTgt>
+                                        </p:tgtEl>
+                                      </p:cBhvr>
+                                    </p:animEffect>
+                                  </p:childTnLst>
+                                </p:cTn>
+                              </p:par>
+                            </p:childTnLst>
+                          </p:cTn>
+                        </p:par>
+                      </p:childTnLst>
+                    </p:cTn>
+                  </p:par>
+                  <p:par>
+                    <p:cTn id="13" fill="hold">
+                      <p:stCondLst>
+                        <p:cond delay="indefinite"/>
+                      </p:stCondLst>
+                      <p:childTnLst>
+                        <p:par>
+                          <p:cTn id="14" fill="hold">
+                            <p:stCondLst>
+                              <p:cond delay="0"/>
+                            </p:stCondLst>
+                            <p:childTnLst>
+                              <p:par>
+                                <p:cTn id="15" presetID="10" presetClass="entr" presetSubtype="0" fill="hold" grpId="0" nodeType="clickEffect">
+                                  <p:stCondLst>
+                                    <p:cond delay="0"/>
+                                  </p:stCondLst>
+                                  <p:childTnLst>
+                                    <p:set>
+                                      <p:cBhvr>
+                                        <p:cTn id="16" dur="1" fill="hold">
+                                          <p:stCondLst>
+                                            <p:cond delay="0"/>
+                                          </p:stCondLst>
+                                        </p:cTn>
+                                        <p:tgtEl>
+                                          <p:spTgt spid="3">
+                                            <p:txEl>
+                                              <p:pRg st="2" end="2"/>
+                                            </p:txEl>
+                                          </p:spTgt>
+                                        </p:tgtEl>
+                                        <p:attrNameLst>
+                                          <p:attrName>style.visibility</p:attrName>
+                                        </p:attrNameLst>
+                                      </p:cBhvr>
+                                      <p:to>
+                                        <p:strVal val="visible"/>
+                                      </p:to>
+                                    </p:set>
+                                    <p:animEffect transition="in" filter="fade">
+                                      <p:cBhvr>
+                                        <p:cTn id="17" dur="500"/>
+                                        <p:tgtEl>
+                                          <p:spTgt spid="3">
+                                            <p:txEl>
+                                              <p:pRg st="2" end="2"/>
+                                            </p:txEl>
+                                          </p:spTgt>
+                                        </p:tgtEl>
+                                      </p:cBhvr>
+                                    </p:animEffect>
+                                  </p:childTnLst>
+                                </p:cTn>
+                              </p:par>
+                            </p:childTnLst>
+                          </p:cTn>
+                        </p:par>
+                      </p:childTnLst>
+                    </p:cTn>
+                  </p:par>
+                  <p:par>
+                    <p:cTn id="18" fill="hold">
+                      <p:stCondLst>
+                        <p:cond delay="indefinite"/>
+                      </p:stCondLst>
+                      <p:childTnLst>
+                        <p:par>
+                          <p:cTn id="19" fill="hold">
+                            <p:stCondLst>
+                              <p:cond delay="0"/>
+                            </p:stCondLst>
+                            <p:childTnLst>
+                              <p:par>
+                                <p:cTn id="20" presetID="10" presetClass="entr" presetSubtype="0" fill="hold" grpId="0" nodeType="clickEffect">
+                                  <p:stCondLst>
+                                    <p:cond delay="0"/>
+                                  </p:stCondLst>
+                                  <p:childTnLst>
+                                    <p:set>
+                                      <p:cBhvr>
+                                        <p:cTn id="21" dur="1" fill="hold">
+                                          <p:stCondLst>
+                                            <p:cond delay="0"/>
+                                          </p:stCondLst>
+                                        </p:cTn>
+                                        <p:tgtEl>
+                                          <p:spTgt spid="3">
+                                            <p:txEl>
+                                              <p:pRg st="3" end="3"/>
+                                            </p:txEl>
+                                          </p:spTgt>
+                                        </p:tgtEl>
+                                        <p:attrNameLst>
+                                          <p:attrName>style.visibility</p:attrName>
+                                        </p:attrNameLst>
+                                      </p:cBhvr>
+                                      <p:to>
+                                        <p:strVal val="visible"/>
+                                      </p:to>
+                                    </p:set>
+                                    <p:animEffect transition="in" filter="fade">
+                                      <p:cBhvr>
+                                        <p:cTn id="22" dur="500"/>
+                                        <p:tgtEl>
+                                          <p:spTgt spid="3">
+                                            <p:txEl>
+                                              <p:pRg st="3" end="3"/>
+                                            </p:txEl>
+                                          </p:spTgt>
+                                        </p:tgtEl>
+                                      </p:cBhvr>
+                                    </p:animEffect>
+                                  </p:childTnLst>
+                                </p:cTn>
+                              </p:par>
+                            </p:childTnLst>
+                          </p:cTn>
+                        </p:par>
+                      </p:childTnLst>
+                    </p:cTn>
+                  </p:par>
+                </p:childTnLst>
+              </p:cTn>
+              <p:prevCondLst>
+                <p:cond evt="onPrev" delay="0">
+                  <p:tgtEl>
+                    <p:sldTgt/>
+                  </p:tgtEl>
+                </p:cond>
+              </p:prevCondLst>
+              <p:nextCondLst>
+                <p:cond evt="onNext" delay="0">
+                  <p:tgtEl>
+                    <p:sldTgt/>
+                  </p:tgtEl>
+                </p:cond>
+              </p:nextCondLst>
+            </p:seq>
+          </p:childTnLst>
+        </p:cTn>
       </p:par>
     </p:tnLst>
+    <p:bldLst>
+      <p:bldP spid="3" grpId="0" build="p"/>
+    </p:bldLst>
   </p:timing>
 </p:sld>
 </file>
 
 <file path=ppt/slides/slide11.xml><?xml version="1.0" encoding="utf-8"?>
+<p:sld xmlns:a="http://schemas.openxmlformats.org/drawingml/2006/main" xmlns:r="http://schemas.openxmlformats.org/officeDocument/2006/relationships" xmlns:p="http://schemas.openxmlformats.org/presentationml/2006/main">
+  <p:cSld>
+    <p:bg>
+      <p:bgPr>
+        <a:gradFill>
+          <a:gsLst>
+            <a:gs pos="62000">
+              <a:schemeClr val="accent1">
+                <a:lumMod val="5000"/>
+                <a:lumOff val="95000"/>
+              </a:schemeClr>
+            </a:gs>
+            <a:gs pos="74000">
+              <a:schemeClr val="accent1">
+                <a:lumMod val="45000"/>
+                <a:lumOff val="55000"/>
+              </a:schemeClr>
+            </a:gs>
+            <a:gs pos="83000">
+              <a:schemeClr val="accent1">
+                <a:lumMod val="45000"/>
+                <a:lumOff val="55000"/>
+              </a:schemeClr>
+            </a:gs>
+            <a:gs pos="100000">
+              <a:schemeClr val="accent1">
+                <a:lumMod val="30000"/>
+                <a:lumOff val="70000"/>
+              </a:schemeClr>
+            </a:gs>
+          </a:gsLst>
+          <a:lin ang="5400000" scaled="1"/>
+        </a:gradFill>
+        <a:effectLst/>
+      </p:bgPr>
+    </p:bg>
+    <p:spTree>
+      <p:nvGrpSpPr>
+        <p:cNvPr id="1" name=""/>
+        <p:cNvGrpSpPr/>
+        <p:nvPr/>
+      </p:nvGrpSpPr>
+      <p:grpSpPr>
+        <a:xfrm>
+          <a:off x="0" y="0"/>
+          <a:ext cx="0" cy="0"/>
+          <a:chOff x="0" y="0"/>
+          <a:chExt cx="0" cy="0"/>
+        </a:xfrm>
+      </p:grpSpPr>
+      <p:sp>
+        <p:nvSpPr>
+          <p:cNvPr id="5" name="Title 1"/>
+          <p:cNvSpPr>
+            <a:spLocks noGrp="1"/>
+          </p:cNvSpPr>
+          <p:nvPr>
+            <p:ph type="title"/>
+          </p:nvPr>
+        </p:nvSpPr>
+        <p:spPr>
+          <a:xfrm>
+            <a:off x="457200" y="274638"/>
+            <a:ext cx="8229600" cy="1143000"/>
+          </a:xfrm>
+        </p:spPr>
+        <p:txBody>
+          <a:bodyPr/>
+          <a:lstStyle/>
+          <a:p>
+            <a:r>
+              <a:rPr lang="en-US" dirty="0" smtClean="0">
+                <a:solidFill>
+                  <a:srgbClr val="C00000"/>
+                </a:solidFill>
+              </a:rPr>
+              <a:t>Pitfalls</a:t>
+            </a:r>
+            <a:endParaRPr lang="he-IL" dirty="0">
+              <a:solidFill>
+                <a:srgbClr val="C00000"/>
+              </a:solidFill>
+            </a:endParaRPr>
+          </a:p>
+        </p:txBody>
+      </p:sp>
+      <p:sp>
+        <p:nvSpPr>
+          <p:cNvPr id="7" name="Content Placeholder 2"/>
+          <p:cNvSpPr>
+            <a:spLocks noGrp="1"/>
+          </p:cNvSpPr>
+          <p:nvPr>
+            <p:ph idx="1"/>
+          </p:nvPr>
+        </p:nvSpPr>
+        <p:spPr>
+          <a:xfrm>
+            <a:off x="457200" y="1600200"/>
+            <a:ext cx="8229600" cy="4525963"/>
+          </a:xfrm>
+        </p:spPr>
+        <p:txBody>
+          <a:bodyPr/>
+          <a:lstStyle/>
+          <a:p>
+            <a:r>
+              <a:rPr lang="en-US" dirty="0" smtClean="0"/>
+              <a:t>Memory handling.</a:t>
+            </a:r>
+          </a:p>
+          <a:p>
+            <a:r>
+              <a:rPr lang="en-US" dirty="0" smtClean="0"/>
+              <a:t>No </a:t>
+            </a:r>
+            <a:r>
+              <a:rPr lang="en-US" dirty="0" err="1" smtClean="0"/>
+              <a:t>try,catch</a:t>
+            </a:r>
+            <a:r>
+              <a:rPr lang="en-US" dirty="0" smtClean="0"/>
+              <a:t> &amp; finally in C.</a:t>
+            </a:r>
+          </a:p>
+          <a:p>
+            <a:r>
+              <a:rPr lang="en-US" dirty="0" smtClean="0"/>
+              <a:t>STM vs HTM. STM is more robust and flexible to big transactions. HTM is much more efficient.</a:t>
+            </a:r>
+          </a:p>
+          <a:p>
+            <a:r>
+              <a:rPr lang="en-US" dirty="0" smtClean="0"/>
+              <a:t>Thread debugging. </a:t>
+            </a:r>
+            <a:endParaRPr lang="en-US" dirty="0"/>
+          </a:p>
+        </p:txBody>
+      </p:sp>
+    </p:spTree>
+    <p:extLst>
+      <p:ext uri="{BB962C8B-B14F-4D97-AF65-F5344CB8AC3E}">
+        <p14:creationId xmlns:p14="http://schemas.microsoft.com/office/powerpoint/2010/main" val="1723126659"/>
+      </p:ext>
+    </p:extLst>
+  </p:cSld>
+  <p:clrMapOvr>
+    <a:masterClrMapping/>
+  </p:clrMapOvr>
+  <p:timing>
+    <p:tnLst>
+      <p:par>
+        <p:cTn id="1" dur="indefinite" restart="never" nodeType="tmRoot">
+          <p:childTnLst>
+            <p:seq concurrent="1" nextAc="seek">
+              <p:cTn id="2" dur="indefinite" nodeType="mainSeq">
+                <p:childTnLst>
+                  <p:par>
+                    <p:cTn id="3" fill="hold">
+                      <p:stCondLst>
+                        <p:cond delay="indefinite"/>
+                      </p:stCondLst>
+                      <p:childTnLst>
+                        <p:par>
+                          <p:cTn id="4" fill="hold">
+                            <p:stCondLst>
+                              <p:cond delay="0"/>
+                            </p:stCondLst>
+                            <p:childTnLst>
+                              <p:par>
+                                <p:cTn id="5" presetID="10" presetClass="entr" presetSubtype="0" fill="hold" grpId="0" nodeType="clickEffect">
+                                  <p:stCondLst>
+                                    <p:cond delay="0"/>
+                                  </p:stCondLst>
+                                  <p:childTnLst>
+                                    <p:set>
+                                      <p:cBhvr>
+                                        <p:cTn id="6" dur="1" fill="hold">
+                                          <p:stCondLst>
+                                            <p:cond delay="0"/>
+                                          </p:stCondLst>
+                                        </p:cTn>
+                                        <p:tgtEl>
+                                          <p:spTgt spid="7">
+                                            <p:txEl>
+                                              <p:pRg st="0" end="0"/>
+                                            </p:txEl>
+                                          </p:spTgt>
+                                        </p:tgtEl>
+                                        <p:attrNameLst>
+                                          <p:attrName>style.visibility</p:attrName>
+                                        </p:attrNameLst>
+                                      </p:cBhvr>
+                                      <p:to>
+                                        <p:strVal val="visible"/>
+                                      </p:to>
+                                    </p:set>
+                                    <p:animEffect transition="in" filter="fade">
+                                      <p:cBhvr>
+                                        <p:cTn id="7" dur="500"/>
+                                        <p:tgtEl>
+                                          <p:spTgt spid="7">
+                                            <p:txEl>
+                                              <p:pRg st="0" end="0"/>
+                                            </p:txEl>
+                                          </p:spTgt>
+                                        </p:tgtEl>
+                                      </p:cBhvr>
+                                    </p:animEffect>
+                                  </p:childTnLst>
+                                </p:cTn>
+                              </p:par>
+                            </p:childTnLst>
+                          </p:cTn>
+                        </p:par>
+                      </p:childTnLst>
+                    </p:cTn>
+                  </p:par>
+                  <p:par>
+                    <p:cTn id="8" fill="hold">
+                      <p:stCondLst>
+                        <p:cond delay="indefinite"/>
+                      </p:stCondLst>
+                      <p:childTnLst>
+                        <p:par>
+                          <p:cTn id="9" fill="hold">
+                            <p:stCondLst>
+                              <p:cond delay="0"/>
+                            </p:stCondLst>
+                            <p:childTnLst>
+                              <p:par>
+                                <p:cTn id="10" presetID="10" presetClass="entr" presetSubtype="0" fill="hold" grpId="0" nodeType="clickEffect">
+                                  <p:stCondLst>
+                                    <p:cond delay="0"/>
+                                  </p:stCondLst>
+                                  <p:childTnLst>
+                                    <p:set>
+                                      <p:cBhvr>
+                                        <p:cTn id="11" dur="1" fill="hold">
+                                          <p:stCondLst>
+                                            <p:cond delay="0"/>
+                                          </p:stCondLst>
+                                        </p:cTn>
+                                        <p:tgtEl>
+                                          <p:spTgt spid="7">
+                                            <p:txEl>
+                                              <p:pRg st="1" end="1"/>
+                                            </p:txEl>
+                                          </p:spTgt>
+                                        </p:tgtEl>
+                                        <p:attrNameLst>
+                                          <p:attrName>style.visibility</p:attrName>
+                                        </p:attrNameLst>
+                                      </p:cBhvr>
+                                      <p:to>
+                                        <p:strVal val="visible"/>
+                                      </p:to>
+                                    </p:set>
+                                    <p:animEffect transition="in" filter="fade">
+                                      <p:cBhvr>
+                                        <p:cTn id="12" dur="500"/>
+                                        <p:tgtEl>
+                                          <p:spTgt spid="7">
+                                            <p:txEl>
+                                              <p:pRg st="1" end="1"/>
+                                            </p:txEl>
+                                          </p:spTgt>
+                                        </p:tgtEl>
+                                      </p:cBhvr>
+                                    </p:animEffect>
+                                  </p:childTnLst>
+                                </p:cTn>
+                              </p:par>
+                            </p:childTnLst>
+                          </p:cTn>
+                        </p:par>
+                      </p:childTnLst>
+                    </p:cTn>
+                  </p:par>
+                  <p:par>
+                    <p:cTn id="13" fill="hold">
+                      <p:stCondLst>
+                        <p:cond delay="indefinite"/>
+                      </p:stCondLst>
+                      <p:childTnLst>
+                        <p:par>
+                          <p:cTn id="14" fill="hold">
+                            <p:stCondLst>
+                              <p:cond delay="0"/>
+                            </p:stCondLst>
+                            <p:childTnLst>
+                              <p:par>
+                                <p:cTn id="15" presetID="10" presetClass="entr" presetSubtype="0" fill="hold" grpId="0" nodeType="clickEffect">
+                                  <p:stCondLst>
+                                    <p:cond delay="0"/>
+                                  </p:stCondLst>
+                                  <p:childTnLst>
+                                    <p:set>
+                                      <p:cBhvr>
+                                        <p:cTn id="16" dur="1" fill="hold">
+                                          <p:stCondLst>
+                                            <p:cond delay="0"/>
+                                          </p:stCondLst>
+                                        </p:cTn>
+                                        <p:tgtEl>
+                                          <p:spTgt spid="7">
+                                            <p:txEl>
+                                              <p:pRg st="2" end="2"/>
+                                            </p:txEl>
+                                          </p:spTgt>
+                                        </p:tgtEl>
+                                        <p:attrNameLst>
+                                          <p:attrName>style.visibility</p:attrName>
+                                        </p:attrNameLst>
+                                      </p:cBhvr>
+                                      <p:to>
+                                        <p:strVal val="visible"/>
+                                      </p:to>
+                                    </p:set>
+                                    <p:animEffect transition="in" filter="fade">
+                                      <p:cBhvr>
+                                        <p:cTn id="17" dur="500"/>
+                                        <p:tgtEl>
+                                          <p:spTgt spid="7">
+                                            <p:txEl>
+                                              <p:pRg st="2" end="2"/>
+                                            </p:txEl>
+                                          </p:spTgt>
+                                        </p:tgtEl>
+                                      </p:cBhvr>
+                                    </p:animEffect>
+                                  </p:childTnLst>
+                                </p:cTn>
+                              </p:par>
+                            </p:childTnLst>
+                          </p:cTn>
+                        </p:par>
+                      </p:childTnLst>
+                    </p:cTn>
+                  </p:par>
+                  <p:par>
+                    <p:cTn id="18" fill="hold">
+                      <p:stCondLst>
+                        <p:cond delay="indefinite"/>
+                      </p:stCondLst>
+                      <p:childTnLst>
+                        <p:par>
+                          <p:cTn id="19" fill="hold">
+                            <p:stCondLst>
+                              <p:cond delay="0"/>
+                            </p:stCondLst>
+                            <p:childTnLst>
+                              <p:par>
+                                <p:cTn id="20" presetID="10" presetClass="entr" presetSubtype="0" fill="hold" grpId="0" nodeType="clickEffect">
+                                  <p:stCondLst>
+                                    <p:cond delay="0"/>
+                                  </p:stCondLst>
+                                  <p:childTnLst>
+                                    <p:set>
+                                      <p:cBhvr>
+                                        <p:cTn id="21" dur="1" fill="hold">
+                                          <p:stCondLst>
+                                            <p:cond delay="0"/>
+                                          </p:stCondLst>
+                                        </p:cTn>
+                                        <p:tgtEl>
+                                          <p:spTgt spid="7">
+                                            <p:txEl>
+                                              <p:pRg st="3" end="3"/>
+                                            </p:txEl>
+                                          </p:spTgt>
+                                        </p:tgtEl>
+                                        <p:attrNameLst>
+                                          <p:attrName>style.visibility</p:attrName>
+                                        </p:attrNameLst>
+                                      </p:cBhvr>
+                                      <p:to>
+                                        <p:strVal val="visible"/>
+                                      </p:to>
+                                    </p:set>
+                                    <p:animEffect transition="in" filter="fade">
+                                      <p:cBhvr>
+                                        <p:cTn id="22" dur="500"/>
+                                        <p:tgtEl>
+                                          <p:spTgt spid="7">
+                                            <p:txEl>
+                                              <p:pRg st="3" end="3"/>
+                                            </p:txEl>
+                                          </p:spTgt>
+                                        </p:tgtEl>
+                                      </p:cBhvr>
+                                    </p:animEffect>
+                                  </p:childTnLst>
+                                </p:cTn>
+                              </p:par>
+                            </p:childTnLst>
+                          </p:cTn>
+                        </p:par>
+                      </p:childTnLst>
+                    </p:cTn>
+                  </p:par>
+                </p:childTnLst>
+              </p:cTn>
+              <p:prevCondLst>
+                <p:cond evt="onPrev" delay="0">
+                  <p:tgtEl>
+                    <p:sldTgt/>
+                  </p:tgtEl>
+                </p:cond>
+              </p:prevCondLst>
+              <p:nextCondLst>
+                <p:cond evt="onNext" delay="0">
+                  <p:tgtEl>
+                    <p:sldTgt/>
+                  </p:tgtEl>
+                </p:cond>
+              </p:nextCondLst>
+            </p:seq>
+          </p:childTnLst>
+        </p:cTn>
+      </p:par>
+    </p:tnLst>
+    <p:bldLst>
+      <p:bldP spid="7" grpId="0" build="p"/>
+    </p:bldLst>
+  </p:timing>
+</p:sld>
+</file>
+
+<file path=ppt/slides/slide12.xml><?xml version="1.0" encoding="utf-8"?>
+<p:sld xmlns:a="http://schemas.openxmlformats.org/drawingml/2006/main" xmlns:r="http://schemas.openxmlformats.org/officeDocument/2006/relationships" xmlns:p="http://schemas.openxmlformats.org/presentationml/2006/main">
+  <p:cSld>
+    <p:bg>
+      <p:bgPr>
+        <a:gradFill>
+          <a:gsLst>
+            <a:gs pos="62000">
+              <a:schemeClr val="accent1">
+                <a:lumMod val="5000"/>
+                <a:lumOff val="95000"/>
+              </a:schemeClr>
+            </a:gs>
+            <a:gs pos="74000">
+              <a:schemeClr val="accent1">
+                <a:lumMod val="45000"/>
+                <a:lumOff val="55000"/>
+              </a:schemeClr>
+            </a:gs>
+            <a:gs pos="83000">
+              <a:schemeClr val="accent1">
+                <a:lumMod val="45000"/>
+                <a:lumOff val="55000"/>
+              </a:schemeClr>
+            </a:gs>
+            <a:gs pos="100000">
+              <a:schemeClr val="accent1">
+                <a:lumMod val="30000"/>
+                <a:lumOff val="70000"/>
+              </a:schemeClr>
+            </a:gs>
+          </a:gsLst>
+          <a:lin ang="5400000" scaled="1"/>
+        </a:gradFill>
+        <a:effectLst/>
+      </p:bgPr>
+    </p:bg>
+    <p:spTree>
+      <p:nvGrpSpPr>
+        <p:cNvPr id="1" name=""/>
+        <p:cNvGrpSpPr/>
+        <p:nvPr/>
+      </p:nvGrpSpPr>
+      <p:grpSpPr>
+        <a:xfrm>
+          <a:off x="0" y="0"/>
+          <a:ext cx="0" cy="0"/>
+          <a:chOff x="0" y="0"/>
+          <a:chExt cx="0" cy="0"/>
+        </a:xfrm>
+      </p:grpSpPr>
+      <p:sp>
+        <p:nvSpPr>
+          <p:cNvPr id="6" name="Title 1"/>
+          <p:cNvSpPr>
+            <a:spLocks noGrp="1"/>
+          </p:cNvSpPr>
+          <p:nvPr>
+            <p:ph type="title"/>
+          </p:nvPr>
+        </p:nvSpPr>
+        <p:spPr>
+          <a:xfrm>
+            <a:off x="457200" y="274638"/>
+            <a:ext cx="8229600" cy="1143000"/>
+          </a:xfrm>
+        </p:spPr>
+        <p:txBody>
+          <a:bodyPr>
+            <a:normAutofit fontScale="90000"/>
+          </a:bodyPr>
+          <a:lstStyle/>
+          <a:p>
+            <a:r>
+              <a:rPr lang="en-US" dirty="0" smtClean="0">
+                <a:solidFill>
+                  <a:srgbClr val="C00000"/>
+                </a:solidFill>
+              </a:rPr>
+              <a:t>Efficiency VS. Coding Difficulties - Java </a:t>
+            </a:r>
+            <a:endParaRPr lang="he-IL" dirty="0">
+              <a:solidFill>
+                <a:srgbClr val="C00000"/>
+              </a:solidFill>
+            </a:endParaRPr>
+          </a:p>
+        </p:txBody>
+      </p:sp>
+      <p:sp>
+        <p:nvSpPr>
+          <p:cNvPr id="8" name="Content Placeholder 2"/>
+          <p:cNvSpPr>
+            <a:spLocks noGrp="1"/>
+          </p:cNvSpPr>
+          <p:nvPr>
+            <p:ph idx="1"/>
+          </p:nvPr>
+        </p:nvSpPr>
+        <p:spPr>
+          <a:xfrm>
+            <a:off x="457200" y="1600200"/>
+            <a:ext cx="8229600" cy="4525963"/>
+          </a:xfrm>
+        </p:spPr>
+        <p:txBody>
+          <a:bodyPr>
+            <a:normAutofit fontScale="92500" lnSpcReduction="10000"/>
+          </a:bodyPr>
+          <a:lstStyle/>
+          <a:p>
+            <a:r>
+              <a:rPr lang="en-US" dirty="0"/>
+              <a:t>T</a:t>
+            </a:r>
+            <a:r>
+              <a:rPr lang="en-US" dirty="0" smtClean="0"/>
+              <a:t>he transaction memory implementations had  an overhead of creating the </a:t>
+            </a:r>
+            <a:r>
+              <a:rPr lang="en-US" dirty="0" err="1" smtClean="0"/>
+              <a:t>updateLT</a:t>
+            </a:r>
+            <a:r>
+              <a:rPr lang="en-US" dirty="0" smtClean="0"/>
+              <a:t>/</a:t>
+            </a:r>
+            <a:r>
+              <a:rPr lang="en-US" dirty="0" err="1" smtClean="0"/>
+              <a:t>removeLT</a:t>
+            </a:r>
+            <a:r>
+              <a:rPr lang="en-US" dirty="0" smtClean="0"/>
+              <a:t> functions. It had good results when the modify part in the application was small. When the modify part was much bigger, transaction had worse results than the global lock.</a:t>
+            </a:r>
+          </a:p>
+          <a:p>
+            <a:r>
+              <a:rPr lang="en-US" dirty="0" smtClean="0"/>
+              <a:t>Global lock was the easiest to implement.</a:t>
+            </a:r>
+          </a:p>
+          <a:p>
+            <a:r>
+              <a:rPr lang="en-US" dirty="0" smtClean="0"/>
+              <a:t>Grained lock was the hardest to implement and seems to have the best results ( or similar to transaction when modification part is small).</a:t>
+            </a:r>
+            <a:endParaRPr lang="he-IL" dirty="0"/>
+          </a:p>
+        </p:txBody>
+      </p:sp>
+    </p:spTree>
+    <p:extLst>
+      <p:ext uri="{BB962C8B-B14F-4D97-AF65-F5344CB8AC3E}">
+        <p14:creationId xmlns:p14="http://schemas.microsoft.com/office/powerpoint/2010/main" val="777660626"/>
+      </p:ext>
+    </p:extLst>
+  </p:cSld>
+  <p:clrMapOvr>
+    <a:masterClrMapping/>
+  </p:clrMapOvr>
+  <p:timing>
+    <p:tnLst>
+      <p:par>
+        <p:cTn id="1" dur="indefinite" restart="never" nodeType="tmRoot">
+          <p:childTnLst>
+            <p:seq concurrent="1" nextAc="seek">
+              <p:cTn id="2" dur="indefinite" nodeType="mainSeq">
+                <p:childTnLst>
+                  <p:par>
+                    <p:cTn id="3" fill="hold">
+                      <p:stCondLst>
+                        <p:cond delay="indefinite"/>
+                      </p:stCondLst>
+                      <p:childTnLst>
+                        <p:par>
+                          <p:cTn id="4" fill="hold">
+                            <p:stCondLst>
+                              <p:cond delay="0"/>
+                            </p:stCondLst>
+                            <p:childTnLst>
+                              <p:par>
+                                <p:cTn id="5" presetID="10" presetClass="entr" presetSubtype="0" fill="hold" grpId="0" nodeType="clickEffect">
+                                  <p:stCondLst>
+                                    <p:cond delay="0"/>
+                                  </p:stCondLst>
+                                  <p:childTnLst>
+                                    <p:set>
+                                      <p:cBhvr>
+                                        <p:cTn id="6" dur="1" fill="hold">
+                                          <p:stCondLst>
+                                            <p:cond delay="0"/>
+                                          </p:stCondLst>
+                                        </p:cTn>
+                                        <p:tgtEl>
+                                          <p:spTgt spid="8">
+                                            <p:txEl>
+                                              <p:pRg st="0" end="0"/>
+                                            </p:txEl>
+                                          </p:spTgt>
+                                        </p:tgtEl>
+                                        <p:attrNameLst>
+                                          <p:attrName>style.visibility</p:attrName>
+                                        </p:attrNameLst>
+                                      </p:cBhvr>
+                                      <p:to>
+                                        <p:strVal val="visible"/>
+                                      </p:to>
+                                    </p:set>
+                                    <p:animEffect transition="in" filter="fade">
+                                      <p:cBhvr>
+                                        <p:cTn id="7" dur="500"/>
+                                        <p:tgtEl>
+                                          <p:spTgt spid="8">
+                                            <p:txEl>
+                                              <p:pRg st="0" end="0"/>
+                                            </p:txEl>
+                                          </p:spTgt>
+                                        </p:tgtEl>
+                                      </p:cBhvr>
+                                    </p:animEffect>
+                                  </p:childTnLst>
+                                </p:cTn>
+                              </p:par>
+                            </p:childTnLst>
+                          </p:cTn>
+                        </p:par>
+                      </p:childTnLst>
+                    </p:cTn>
+                  </p:par>
+                  <p:par>
+                    <p:cTn id="8" fill="hold">
+                      <p:stCondLst>
+                        <p:cond delay="indefinite"/>
+                      </p:stCondLst>
+                      <p:childTnLst>
+                        <p:par>
+                          <p:cTn id="9" fill="hold">
+                            <p:stCondLst>
+                              <p:cond delay="0"/>
+                            </p:stCondLst>
+                            <p:childTnLst>
+                              <p:par>
+                                <p:cTn id="10" presetID="10" presetClass="entr" presetSubtype="0" fill="hold" grpId="0" nodeType="clickEffect">
+                                  <p:stCondLst>
+                                    <p:cond delay="0"/>
+                                  </p:stCondLst>
+                                  <p:childTnLst>
+                                    <p:set>
+                                      <p:cBhvr>
+                                        <p:cTn id="11" dur="1" fill="hold">
+                                          <p:stCondLst>
+                                            <p:cond delay="0"/>
+                                          </p:stCondLst>
+                                        </p:cTn>
+                                        <p:tgtEl>
+                                          <p:spTgt spid="8">
+                                            <p:txEl>
+                                              <p:pRg st="1" end="1"/>
+                                            </p:txEl>
+                                          </p:spTgt>
+                                        </p:tgtEl>
+                                        <p:attrNameLst>
+                                          <p:attrName>style.visibility</p:attrName>
+                                        </p:attrNameLst>
+                                      </p:cBhvr>
+                                      <p:to>
+                                        <p:strVal val="visible"/>
+                                      </p:to>
+                                    </p:set>
+                                    <p:animEffect transition="in" filter="fade">
+                                      <p:cBhvr>
+                                        <p:cTn id="12" dur="500"/>
+                                        <p:tgtEl>
+                                          <p:spTgt spid="8">
+                                            <p:txEl>
+                                              <p:pRg st="1" end="1"/>
+                                            </p:txEl>
+                                          </p:spTgt>
+                                        </p:tgtEl>
+                                      </p:cBhvr>
+                                    </p:animEffect>
+                                  </p:childTnLst>
+                                </p:cTn>
+                              </p:par>
+                            </p:childTnLst>
+                          </p:cTn>
+                        </p:par>
+                      </p:childTnLst>
+                    </p:cTn>
+                  </p:par>
+                  <p:par>
+                    <p:cTn id="13" fill="hold">
+                      <p:stCondLst>
+                        <p:cond delay="indefinite"/>
+                      </p:stCondLst>
+                      <p:childTnLst>
+                        <p:par>
+                          <p:cTn id="14" fill="hold">
+                            <p:stCondLst>
+                              <p:cond delay="0"/>
+                            </p:stCondLst>
+                            <p:childTnLst>
+                              <p:par>
+                                <p:cTn id="15" presetID="10" presetClass="entr" presetSubtype="0" fill="hold" grpId="0" nodeType="clickEffect">
+                                  <p:stCondLst>
+                                    <p:cond delay="0"/>
+                                  </p:stCondLst>
+                                  <p:childTnLst>
+                                    <p:set>
+                                      <p:cBhvr>
+                                        <p:cTn id="16" dur="1" fill="hold">
+                                          <p:stCondLst>
+                                            <p:cond delay="0"/>
+                                          </p:stCondLst>
+                                        </p:cTn>
+                                        <p:tgtEl>
+                                          <p:spTgt spid="8">
+                                            <p:txEl>
+                                              <p:pRg st="2" end="2"/>
+                                            </p:txEl>
+                                          </p:spTgt>
+                                        </p:tgtEl>
+                                        <p:attrNameLst>
+                                          <p:attrName>style.visibility</p:attrName>
+                                        </p:attrNameLst>
+                                      </p:cBhvr>
+                                      <p:to>
+                                        <p:strVal val="visible"/>
+                                      </p:to>
+                                    </p:set>
+                                    <p:animEffect transition="in" filter="fade">
+                                      <p:cBhvr>
+                                        <p:cTn id="17" dur="500"/>
+                                        <p:tgtEl>
+                                          <p:spTgt spid="8">
+                                            <p:txEl>
+                                              <p:pRg st="2" end="2"/>
+                                            </p:txEl>
+                                          </p:spTgt>
+                                        </p:tgtEl>
+                                      </p:cBhvr>
+                                    </p:animEffect>
+                                  </p:childTnLst>
+                                </p:cTn>
+                              </p:par>
+                            </p:childTnLst>
+                          </p:cTn>
+                        </p:par>
+                      </p:childTnLst>
+                    </p:cTn>
+                  </p:par>
+                </p:childTnLst>
+              </p:cTn>
+              <p:prevCondLst>
+                <p:cond evt="onPrev" delay="0">
+                  <p:tgtEl>
+                    <p:sldTgt/>
+                  </p:tgtEl>
+                </p:cond>
+              </p:prevCondLst>
+              <p:nextCondLst>
+                <p:cond evt="onNext" delay="0">
+                  <p:tgtEl>
+                    <p:sldTgt/>
+                  </p:tgtEl>
+                </p:cond>
+              </p:nextCondLst>
+            </p:seq>
+          </p:childTnLst>
+        </p:cTn>
+      </p:par>
+    </p:tnLst>
+    <p:bldLst>
+      <p:bldP spid="8" grpId="0" build="p"/>
+    </p:bldLst>
+  </p:timing>
+</p:sld>
+</file>
+
+<file path=ppt/slides/slide13.xml><?xml version="1.0" encoding="utf-8"?>
+<p:sld xmlns:a="http://schemas.openxmlformats.org/drawingml/2006/main" xmlns:r="http://schemas.openxmlformats.org/officeDocument/2006/relationships" xmlns:p="http://schemas.openxmlformats.org/presentationml/2006/main">
+  <p:cSld>
+    <p:bg>
+      <p:bgPr>
+        <a:gradFill>
+          <a:gsLst>
+            <a:gs pos="62000">
+              <a:schemeClr val="accent1">
+                <a:lumMod val="5000"/>
+                <a:lumOff val="95000"/>
+              </a:schemeClr>
+            </a:gs>
+            <a:gs pos="74000">
+              <a:schemeClr val="accent1">
+                <a:lumMod val="45000"/>
+                <a:lumOff val="55000"/>
+              </a:schemeClr>
+            </a:gs>
+            <a:gs pos="83000">
+              <a:schemeClr val="accent1">
+                <a:lumMod val="45000"/>
+                <a:lumOff val="55000"/>
+              </a:schemeClr>
+            </a:gs>
+            <a:gs pos="100000">
+              <a:schemeClr val="accent1">
+                <a:lumMod val="30000"/>
+                <a:lumOff val="70000"/>
+              </a:schemeClr>
+            </a:gs>
+          </a:gsLst>
+          <a:lin ang="5400000" scaled="1"/>
+        </a:gradFill>
+        <a:effectLst/>
+      </p:bgPr>
+    </p:bg>
+    <p:spTree>
+      <p:nvGrpSpPr>
+        <p:cNvPr id="1" name=""/>
+        <p:cNvGrpSpPr/>
+        <p:nvPr/>
+      </p:nvGrpSpPr>
+      <p:grpSpPr>
+        <a:xfrm>
+          <a:off x="0" y="0"/>
+          <a:ext cx="0" cy="0"/>
+          <a:chOff x="0" y="0"/>
+          <a:chExt cx="0" cy="0"/>
+        </a:xfrm>
+      </p:grpSpPr>
+      <p:sp>
+        <p:nvSpPr>
+          <p:cNvPr id="6" name="Title 1"/>
+          <p:cNvSpPr>
+            <a:spLocks noGrp="1"/>
+          </p:cNvSpPr>
+          <p:nvPr>
+            <p:ph type="title"/>
+          </p:nvPr>
+        </p:nvSpPr>
+        <p:spPr>
+          <a:xfrm>
+            <a:off x="457200" y="274638"/>
+            <a:ext cx="8229600" cy="1143000"/>
+          </a:xfrm>
+        </p:spPr>
+        <p:txBody>
+          <a:bodyPr>
+            <a:normAutofit fontScale="90000"/>
+          </a:bodyPr>
+          <a:lstStyle/>
+          <a:p>
+            <a:r>
+              <a:rPr lang="en-US" dirty="0" smtClean="0">
+                <a:solidFill>
+                  <a:srgbClr val="C00000"/>
+                </a:solidFill>
+              </a:rPr>
+              <a:t>Efficiency VS. Coding Difficulties - Java </a:t>
+            </a:r>
+            <a:endParaRPr lang="he-IL" dirty="0">
+              <a:solidFill>
+                <a:srgbClr val="C00000"/>
+              </a:solidFill>
+            </a:endParaRPr>
+          </a:p>
+        </p:txBody>
+      </p:sp>
+      <p:sp>
+        <p:nvSpPr>
+          <p:cNvPr id="5" name="Content Placeholder 2"/>
+          <p:cNvSpPr>
+            <a:spLocks noGrp="1"/>
+          </p:cNvSpPr>
+          <p:nvPr>
+            <p:ph idx="1"/>
+          </p:nvPr>
+        </p:nvSpPr>
+        <p:spPr>
+          <a:xfrm>
+            <a:off x="457200" y="1600200"/>
+            <a:ext cx="8229600" cy="4525963"/>
+          </a:xfrm>
+        </p:spPr>
+        <p:txBody>
+          <a:bodyPr>
+            <a:normAutofit fontScale="92500"/>
+          </a:bodyPr>
+          <a:lstStyle/>
+          <a:p>
+            <a:r>
+              <a:rPr lang="en-US" dirty="0"/>
+              <a:t>The transaction memory implementations </a:t>
+            </a:r>
+            <a:r>
+              <a:rPr lang="en-US" dirty="0" smtClean="0"/>
+              <a:t>were given in STM form.</a:t>
+            </a:r>
+          </a:p>
+          <a:p>
+            <a:r>
+              <a:rPr lang="en-US" dirty="0" smtClean="0"/>
+              <a:t>Changing it to HTM was fairly simple. But, the given implementation didn’t work because its transaction part was too big for an hardware transaction to handle.</a:t>
+            </a:r>
+          </a:p>
+          <a:p>
+            <a:r>
+              <a:rPr lang="en-US" dirty="0" smtClean="0"/>
+              <a:t>Grained lock was the hardest to implement, and it seems to be running better than global lock and worse that the transactions implementations. </a:t>
+            </a:r>
+          </a:p>
+          <a:p>
+            <a:pPr marL="0" indent="0">
+              <a:buNone/>
+            </a:pPr>
+            <a:endParaRPr lang="he-IL" dirty="0"/>
+          </a:p>
+        </p:txBody>
+      </p:sp>
+    </p:spTree>
+    <p:extLst>
+      <p:ext uri="{BB962C8B-B14F-4D97-AF65-F5344CB8AC3E}">
+        <p14:creationId xmlns:p14="http://schemas.microsoft.com/office/powerpoint/2010/main" val="2666866770"/>
+      </p:ext>
+    </p:extLst>
+  </p:cSld>
+  <p:clrMapOvr>
+    <a:masterClrMapping/>
+  </p:clrMapOvr>
+  <p:timing>
+    <p:tnLst>
+      <p:par>
+        <p:cTn id="1" dur="indefinite" restart="never" nodeType="tmRoot">
+          <p:childTnLst>
+            <p:seq concurrent="1" nextAc="seek">
+              <p:cTn id="2" dur="indefinite" nodeType="mainSeq">
+                <p:childTnLst>
+                  <p:par>
+                    <p:cTn id="3" fill="hold">
+                      <p:stCondLst>
+                        <p:cond delay="indefinite"/>
+                      </p:stCondLst>
+                      <p:childTnLst>
+                        <p:par>
+                          <p:cTn id="4" fill="hold">
+                            <p:stCondLst>
+                              <p:cond delay="0"/>
+                            </p:stCondLst>
+                            <p:childTnLst>
+                              <p:par>
+                                <p:cTn id="5" presetID="10" presetClass="entr" presetSubtype="0" fill="hold" grpId="0" nodeType="clickEffect">
+                                  <p:stCondLst>
+                                    <p:cond delay="0"/>
+                                  </p:stCondLst>
+                                  <p:childTnLst>
+                                    <p:set>
+                                      <p:cBhvr>
+                                        <p:cTn id="6" dur="1" fill="hold">
+                                          <p:stCondLst>
+                                            <p:cond delay="0"/>
+                                          </p:stCondLst>
+                                        </p:cTn>
+                                        <p:tgtEl>
+                                          <p:spTgt spid="5">
+                                            <p:txEl>
+                                              <p:pRg st="0" end="0"/>
+                                            </p:txEl>
+                                          </p:spTgt>
+                                        </p:tgtEl>
+                                        <p:attrNameLst>
+                                          <p:attrName>style.visibility</p:attrName>
+                                        </p:attrNameLst>
+                                      </p:cBhvr>
+                                      <p:to>
+                                        <p:strVal val="visible"/>
+                                      </p:to>
+                                    </p:set>
+                                    <p:animEffect transition="in" filter="fade">
+                                      <p:cBhvr>
+                                        <p:cTn id="7" dur="500"/>
+                                        <p:tgtEl>
+                                          <p:spTgt spid="5">
+                                            <p:txEl>
+                                              <p:pRg st="0" end="0"/>
+                                            </p:txEl>
+                                          </p:spTgt>
+                                        </p:tgtEl>
+                                      </p:cBhvr>
+                                    </p:animEffect>
+                                  </p:childTnLst>
+                                </p:cTn>
+                              </p:par>
+                            </p:childTnLst>
+                          </p:cTn>
+                        </p:par>
+                      </p:childTnLst>
+                    </p:cTn>
+                  </p:par>
+                  <p:par>
+                    <p:cTn id="8" fill="hold">
+                      <p:stCondLst>
+                        <p:cond delay="indefinite"/>
+                      </p:stCondLst>
+                      <p:childTnLst>
+                        <p:par>
+                          <p:cTn id="9" fill="hold">
+                            <p:stCondLst>
+                              <p:cond delay="0"/>
+                            </p:stCondLst>
+                            <p:childTnLst>
+                              <p:par>
+                                <p:cTn id="10" presetID="10" presetClass="entr" presetSubtype="0" fill="hold" grpId="0" nodeType="clickEffect">
+                                  <p:stCondLst>
+                                    <p:cond delay="0"/>
+                                  </p:stCondLst>
+                                  <p:childTnLst>
+                                    <p:set>
+                                      <p:cBhvr>
+                                        <p:cTn id="11" dur="1" fill="hold">
+                                          <p:stCondLst>
+                                            <p:cond delay="0"/>
+                                          </p:stCondLst>
+                                        </p:cTn>
+                                        <p:tgtEl>
+                                          <p:spTgt spid="5">
+                                            <p:txEl>
+                                              <p:pRg st="1" end="1"/>
+                                            </p:txEl>
+                                          </p:spTgt>
+                                        </p:tgtEl>
+                                        <p:attrNameLst>
+                                          <p:attrName>style.visibility</p:attrName>
+                                        </p:attrNameLst>
+                                      </p:cBhvr>
+                                      <p:to>
+                                        <p:strVal val="visible"/>
+                                      </p:to>
+                                    </p:set>
+                                    <p:animEffect transition="in" filter="fade">
+                                      <p:cBhvr>
+                                        <p:cTn id="12" dur="500"/>
+                                        <p:tgtEl>
+                                          <p:spTgt spid="5">
+                                            <p:txEl>
+                                              <p:pRg st="1" end="1"/>
+                                            </p:txEl>
+                                          </p:spTgt>
+                                        </p:tgtEl>
+                                      </p:cBhvr>
+                                    </p:animEffect>
+                                  </p:childTnLst>
+                                </p:cTn>
+                              </p:par>
+                            </p:childTnLst>
+                          </p:cTn>
+                        </p:par>
+                      </p:childTnLst>
+                    </p:cTn>
+                  </p:par>
+                  <p:par>
+                    <p:cTn id="13" fill="hold">
+                      <p:stCondLst>
+                        <p:cond delay="indefinite"/>
+                      </p:stCondLst>
+                      <p:childTnLst>
+                        <p:par>
+                          <p:cTn id="14" fill="hold">
+                            <p:stCondLst>
+                              <p:cond delay="0"/>
+                            </p:stCondLst>
+                            <p:childTnLst>
+                              <p:par>
+                                <p:cTn id="15" presetID="10" presetClass="entr" presetSubtype="0" fill="hold" grpId="0" nodeType="clickEffect">
+                                  <p:stCondLst>
+                                    <p:cond delay="0"/>
+                                  </p:stCondLst>
+                                  <p:childTnLst>
+                                    <p:set>
+                                      <p:cBhvr>
+                                        <p:cTn id="16" dur="1" fill="hold">
+                                          <p:stCondLst>
+                                            <p:cond delay="0"/>
+                                          </p:stCondLst>
+                                        </p:cTn>
+                                        <p:tgtEl>
+                                          <p:spTgt spid="5">
+                                            <p:txEl>
+                                              <p:pRg st="2" end="2"/>
+                                            </p:txEl>
+                                          </p:spTgt>
+                                        </p:tgtEl>
+                                        <p:attrNameLst>
+                                          <p:attrName>style.visibility</p:attrName>
+                                        </p:attrNameLst>
+                                      </p:cBhvr>
+                                      <p:to>
+                                        <p:strVal val="visible"/>
+                                      </p:to>
+                                    </p:set>
+                                    <p:animEffect transition="in" filter="fade">
+                                      <p:cBhvr>
+                                        <p:cTn id="17" dur="500"/>
+                                        <p:tgtEl>
+                                          <p:spTgt spid="5">
+                                            <p:txEl>
+                                              <p:pRg st="2" end="2"/>
+                                            </p:txEl>
+                                          </p:spTgt>
+                                        </p:tgtEl>
+                                      </p:cBhvr>
+                                    </p:animEffect>
+                                  </p:childTnLst>
+                                </p:cTn>
+                              </p:par>
+                            </p:childTnLst>
+                          </p:cTn>
+                        </p:par>
+                      </p:childTnLst>
+                    </p:cTn>
+                  </p:par>
+                </p:childTnLst>
+              </p:cTn>
+              <p:prevCondLst>
+                <p:cond evt="onPrev" delay="0">
+                  <p:tgtEl>
+                    <p:sldTgt/>
+                  </p:tgtEl>
+                </p:cond>
+              </p:prevCondLst>
+              <p:nextCondLst>
+                <p:cond evt="onNext" delay="0">
+                  <p:tgtEl>
+                    <p:sldTgt/>
+                  </p:tgtEl>
+                </p:cond>
+              </p:nextCondLst>
+            </p:seq>
+          </p:childTnLst>
+        </p:cTn>
+      </p:par>
+    </p:tnLst>
+    <p:bldLst>
+      <p:bldP spid="5" grpId="0" build="p"/>
+    </p:bldLst>
+  </p:timing>
+</p:sld>
+</file>
+
+<file path=ppt/slides/slide14.xml><?xml version="1.0" encoding="utf-8"?>
 <p:sld xmlns:a="http://schemas.openxmlformats.org/drawingml/2006/main" xmlns:r="http://schemas.openxmlformats.org/officeDocument/2006/relationships" xmlns:p="http://schemas.openxmlformats.org/presentationml/2006/main">
   <p:cSld>
     <p:bg>
@@ -4115,11 +5600,7 @@
           <a:p>
             <a:r>
               <a:rPr lang="en-US" dirty="0" smtClean="0"/>
-              <a:t>What’s a skip list</a:t>
-            </a:r>
-            <a:r>
-              <a:rPr lang="en-US" dirty="0" smtClean="0"/>
-              <a:t>?</a:t>
+              <a:t>What’s a skip list?</a:t>
             </a:r>
           </a:p>
           <a:p>
@@ -4127,7 +5608,6 @@
               <a:rPr lang="en-US" dirty="0" smtClean="0"/>
               <a:t>Our data structure is base on a set of n Leap-Lists. </a:t>
             </a:r>
-            <a:endParaRPr lang="en-US" dirty="0" smtClean="0"/>
           </a:p>
           <a:p>
             <a:endParaRPr lang="en-US" dirty="0"/>
@@ -5883,12 +7363,20 @@
           </a:p>
           <a:p>
             <a:r>
-              <a:rPr lang="en-US" dirty="0" err="1" smtClean="0"/>
+              <a:rPr lang="en-US" dirty="0" smtClean="0"/>
+              <a:t>n </a:t>
+            </a:r>
+            <a:r>
+              <a:rPr lang="en-US" dirty="0"/>
+              <a:t>= </a:t>
+            </a:r>
+            <a:r>
+              <a:rPr lang="en-US" dirty="0" err="1"/>
               <a:t>na</a:t>
             </a:r>
             <a:r>
-              <a:rPr lang="en-US" dirty="0" smtClean="0"/>
-              <a:t>[0] = n</a:t>
+              <a:rPr lang="en-US" dirty="0"/>
+              <a:t>[0] </a:t>
             </a:r>
             <a:endParaRPr lang="en-US" dirty="0"/>
           </a:p>
@@ -6010,26 +7498,70 @@
         </p:nvSpPr>
         <p:spPr/>
         <p:txBody>
-          <a:bodyPr/>
+          <a:bodyPr>
+            <a:normAutofit fontScale="92500" lnSpcReduction="10000"/>
+          </a:bodyPr>
           <a:lstStyle/>
           <a:p>
             <a:r>
               <a:rPr lang="en-US" dirty="0" smtClean="0"/>
-              <a:t>In the grained locking mechanism the locks move from the API functions to the individual nodes themselves.</a:t>
-            </a:r>
-          </a:p>
-          <a:p>
+              <a:t>The fine grained implementation is base on the “lazy skip list” </a:t>
+            </a:r>
+            <a:r>
+              <a:rPr lang="en-US" dirty="0" err="1" smtClean="0"/>
+              <a:t>algorithem</a:t>
+            </a:r>
             <a:r>
               <a:rPr lang="en-US" dirty="0" smtClean="0"/>
-              <a:t>Only the nodes that needs to be replaced (by the update or remove functions) are actually locked.</a:t>
+              <a:t>.</a:t>
             </a:r>
           </a:p>
           <a:p>
             <a:r>
               <a:rPr lang="en-US" dirty="0" smtClean="0"/>
-              <a:t>The lookup functions checks the “live” fields instead of using locks.</a:t>
-            </a:r>
-            <a:endParaRPr lang="en-US" dirty="0"/>
+              <a:t>In </a:t>
+            </a:r>
+            <a:r>
+              <a:rPr lang="en-US" dirty="0" smtClean="0"/>
+              <a:t>the grained locking mechanism the locks move from the API functions to the individual nodes themselves.</a:t>
+            </a:r>
+          </a:p>
+          <a:p>
+            <a:r>
+              <a:rPr lang="en-US" dirty="0" smtClean="0"/>
+              <a:t>Only the nodes that </a:t>
+            </a:r>
+            <a:r>
+              <a:rPr lang="en-US" dirty="0" smtClean="0"/>
+              <a:t>are changed </a:t>
+            </a:r>
+            <a:r>
+              <a:rPr lang="en-US" dirty="0" smtClean="0"/>
+              <a:t>(by the update or remove functions) </a:t>
+            </a:r>
+            <a:r>
+              <a:rPr lang="en-US" dirty="0" smtClean="0"/>
+              <a:t>and their predecessors are </a:t>
+            </a:r>
+            <a:r>
+              <a:rPr lang="en-US" dirty="0" smtClean="0"/>
+              <a:t>actually locked.</a:t>
+            </a:r>
+          </a:p>
+          <a:p>
+            <a:r>
+              <a:rPr lang="en-US" dirty="0" smtClean="0"/>
+              <a:t>The lookup functions checks the “live” fields instead of using </a:t>
+            </a:r>
+            <a:r>
+              <a:rPr lang="en-US" dirty="0" smtClean="0"/>
+              <a:t>locks</a:t>
+            </a:r>
+            <a:r>
+              <a:rPr lang="en-US" dirty="0"/>
+              <a:t>.</a:t>
+            </a:r>
+            <a:endParaRPr lang="en-US" dirty="0" smtClean="0"/>
           </a:p>
         </p:txBody>
       </p:sp>
@@ -6220,6 +7752,67 @@
                                           <p:spTgt spid="3">
                                             <p:txEl>
                                               <p:pRg st="2" end="2"/>
+                                            </p:txEl>
+                                          </p:spTgt>
+                                        </p:tgtEl>
+                                      </p:cBhvr>
+                                    </p:animEffect>
+                                  </p:childTnLst>
+                                </p:cTn>
+                              </p:par>
+                            </p:childTnLst>
+                          </p:cTn>
+                        </p:par>
+                      </p:childTnLst>
+                    </p:cTn>
+                  </p:par>
+                  <p:par>
+                    <p:cTn id="18" fill="hold">
+                      <p:stCondLst>
+                        <p:cond delay="indefinite"/>
+                      </p:stCondLst>
+                      <p:childTnLst>
+                        <p:par>
+                          <p:cTn id="19" fill="hold">
+                            <p:stCondLst>
+                              <p:cond delay="0"/>
+                            </p:stCondLst>
+                            <p:childTnLst>
+                              <p:par>
+                                <p:cTn id="20" presetID="10" presetClass="entr" presetSubtype="0" fill="hold" grpId="0" nodeType="clickEffect">
+                                  <p:stCondLst>
+                                    <p:cond delay="0"/>
+                                  </p:stCondLst>
+                                  <p:childTnLst>
+                                    <p:set>
+                                      <p:cBhvr>
+                                        <p:cTn id="21" dur="1" fill="hold">
+                                          <p:stCondLst>
+                                            <p:cond delay="0"/>
+                                          </p:stCondLst>
+                                        </p:cTn>
+                                        <p:tgtEl>
+                                          <p:spTgt spid="3">
+                                            <p:txEl>
+                                              <p:pRg st="3" end="3"/>
+                                            </p:txEl>
+                                          </p:spTgt>
+                                        </p:tgtEl>
+                                        <p:attrNameLst>
+                                          <p:attrName>style.visibility</p:attrName>
+                                        </p:attrNameLst>
+                                      </p:cBhvr>
+                                      <p:to>
+                                        <p:strVal val="visible"/>
+                                      </p:to>
+                                    </p:set>
+                                    <p:animEffect transition="in" filter="fade">
+                                      <p:cBhvr>
+                                        <p:cTn id="22" dur="500"/>
+                                        <p:tgtEl>
+                                          <p:spTgt spid="3">
+                                            <p:txEl>
+                                              <p:pRg st="3" end="3"/>
                                             </p:txEl>
                                           </p:spTgt>
                                         </p:tgtEl>
@@ -6651,12 +8244,12 @@
               <a:t>Our </a:t>
             </a:r>
             <a:r>
-              <a:rPr lang="en-US" dirty="0" err="1" smtClean="0">
+              <a:rPr lang="en-US" dirty="0" smtClean="0">
                 <a:solidFill>
                   <a:srgbClr val="C00000"/>
                 </a:solidFill>
               </a:rPr>
-              <a:t>improvment</a:t>
+              <a:t>improvement</a:t>
             </a:r>
             <a:endParaRPr lang="en-US" dirty="0">
               <a:solidFill>
@@ -6695,7 +8288,15 @@
           <a:p>
             <a:r>
               <a:rPr lang="en-US" dirty="0" smtClean="0"/>
-              <a:t>In the “c” module the transactional code didn’t work before improvement.</a:t>
+              <a:t>In the “c” module </a:t>
+            </a:r>
+            <a:r>
+              <a:rPr lang="en-US" dirty="0" smtClean="0"/>
+              <a:t>the hardware </a:t>
+            </a:r>
+            <a:r>
+              <a:rPr lang="en-US" dirty="0" smtClean="0"/>
+              <a:t>transactional code didn’t work before improvement.</a:t>
             </a:r>
             <a:endParaRPr lang="en-US" dirty="0"/>
           </a:p>

</xml_diff>